<commit_message>
change flat cover img
</commit_message>
<xml_diff>
--- a/_raw/img.pptx
+++ b/_raw/img.pptx
@@ -5,10 +5,11 @@
     <p:sldMasterId id="2147483648" r:id="rId1"/>
   </p:sldMasterIdLst>
   <p:notesMasterIdLst>
-    <p:notesMasterId r:id="rId3"/>
+    <p:notesMasterId r:id="rId4"/>
   </p:notesMasterIdLst>
   <p:sldIdLst>
     <p:sldId id="256" r:id="rId2"/>
+    <p:sldId id="257" r:id="rId3"/>
   </p:sldIdLst>
   <p:sldSz cx="12192000" cy="6858000"/>
   <p:notesSz cx="6858000" cy="9144000"/>
@@ -3837,6 +3838,66 @@
     <p:extLst>
       <p:ext uri="{BB962C8B-B14F-4D97-AF65-F5344CB8AC3E}">
         <p14:creationId xmlns:p14="http://schemas.microsoft.com/office/powerpoint/2010/main" val="1139672485"/>
+      </p:ext>
+    </p:extLst>
+  </p:cSld>
+  <p:clrMapOvr>
+    <a:masterClrMapping/>
+  </p:clrMapOvr>
+</p:sld>
+</file>
+
+<file path=ppt/slides/slide2.xml><?xml version="1.0" encoding="utf-8"?>
+<p:sld xmlns:a="http://schemas.openxmlformats.org/drawingml/2006/main" xmlns:r="http://schemas.openxmlformats.org/officeDocument/2006/relationships" xmlns:p="http://schemas.openxmlformats.org/presentationml/2006/main">
+  <p:cSld>
+    <p:spTree>
+      <p:nvGrpSpPr>
+        <p:cNvPr id="1" name=""/>
+        <p:cNvGrpSpPr/>
+        <p:nvPr/>
+      </p:nvGrpSpPr>
+      <p:grpSpPr>
+        <a:xfrm>
+          <a:off x="0" y="0"/>
+          <a:ext cx="0" cy="0"/>
+          <a:chOff x="0" y="0"/>
+          <a:chExt cx="0" cy="0"/>
+        </a:xfrm>
+      </p:grpSpPr>
+      <p:pic>
+        <p:nvPicPr>
+          <p:cNvPr id="6" name="그림 5" descr="텍스트, 하늘, 표지판, 실외이(가) 표시된 사진&#10;&#10;자동 생성된 설명">
+            <a:extLst>
+              <a:ext uri="{FF2B5EF4-FFF2-40B4-BE49-F238E27FC236}">
+                <a16:creationId xmlns:a16="http://schemas.microsoft.com/office/drawing/2014/main" id="{4E2E2591-8405-5242-BC9B-900097519783}"/>
+              </a:ext>
+            </a:extLst>
+          </p:cNvPr>
+          <p:cNvPicPr>
+            <a:picLocks noChangeAspect="1"/>
+          </p:cNvPicPr>
+          <p:nvPr/>
+        </p:nvPicPr>
+        <p:blipFill>
+          <a:blip r:embed="rId2"/>
+          <a:stretch>
+            <a:fillRect/>
+          </a:stretch>
+        </p:blipFill>
+        <p:spPr>
+          <a:xfrm>
+            <a:off x="569520" y="1474107"/>
+            <a:ext cx="10744200" cy="4432300"/>
+          </a:xfrm>
+          <a:prstGeom prst="rect">
+            <a:avLst/>
+          </a:prstGeom>
+        </p:spPr>
+      </p:pic>
+    </p:spTree>
+    <p:extLst>
+      <p:ext uri="{BB962C8B-B14F-4D97-AF65-F5344CB8AC3E}">
+        <p14:creationId xmlns:p14="http://schemas.microsoft.com/office/powerpoint/2010/main" val="1392079622"/>
       </p:ext>
     </p:extLst>
   </p:cSld>

</xml_diff>

<commit_message>
[main] {UV, FAQ} Add
</commit_message>
<xml_diff>
--- a/_raw/img.pptx
+++ b/_raw/img.pptx
@@ -5,12 +5,13 @@
     <p:sldMasterId id="2147483648" r:id="rId1"/>
   </p:sldMasterIdLst>
   <p:notesMasterIdLst>
-    <p:notesMasterId r:id="rId5"/>
+    <p:notesMasterId r:id="rId6"/>
   </p:notesMasterIdLst>
   <p:sldIdLst>
     <p:sldId id="256" r:id="rId2"/>
     <p:sldId id="257" r:id="rId3"/>
     <p:sldId id="258" r:id="rId4"/>
+    <p:sldId id="259" r:id="rId5"/>
   </p:sldIdLst>
   <p:sldSz cx="12192000" cy="6858000"/>
   <p:notesSz cx="6858000" cy="9144000"/>
@@ -210,7 +211,7 @@
           <a:p>
             <a:fld id="{A0F2C3BC-807B-0F44-8628-007C53BB3AB0}" type="datetimeFigureOut">
               <a:rPr kumimoji="1" lang="ko-KR" altLang="en-US" smtClean="0"/>
-              <a:t>2021. 3. 20.</a:t>
+              <a:t>2021. 3. 26.</a:t>
             </a:fld>
             <a:endParaRPr kumimoji="1" lang="ko-KR" altLang="en-US"/>
           </a:p>
@@ -581,6 +582,94 @@
 </p:notes>
 </file>
 
+<file path=ppt/notesSlides/notesSlide2.xml><?xml version="1.0" encoding="utf-8"?>
+<p:notes xmlns:a="http://schemas.openxmlformats.org/drawingml/2006/main" xmlns:r="http://schemas.openxmlformats.org/officeDocument/2006/relationships" xmlns:p="http://schemas.openxmlformats.org/presentationml/2006/main">
+  <p:cSld>
+    <p:spTree>
+      <p:nvGrpSpPr>
+        <p:cNvPr id="1" name=""/>
+        <p:cNvGrpSpPr/>
+        <p:nvPr/>
+      </p:nvGrpSpPr>
+      <p:grpSpPr>
+        <a:xfrm>
+          <a:off x="0" y="0"/>
+          <a:ext cx="0" cy="0"/>
+          <a:chOff x="0" y="0"/>
+          <a:chExt cx="0" cy="0"/>
+        </a:xfrm>
+      </p:grpSpPr>
+      <p:sp>
+        <p:nvSpPr>
+          <p:cNvPr id="2" name="슬라이드 이미지 개체 틀 1"/>
+          <p:cNvSpPr>
+            <a:spLocks noGrp="1" noRot="1" noChangeAspect="1"/>
+          </p:cNvSpPr>
+          <p:nvPr>
+            <p:ph type="sldImg"/>
+          </p:nvPr>
+        </p:nvSpPr>
+        <p:spPr/>
+      </p:sp>
+      <p:sp>
+        <p:nvSpPr>
+          <p:cNvPr id="3" name="슬라이드 노트 개체 틀 2"/>
+          <p:cNvSpPr>
+            <a:spLocks noGrp="1"/>
+          </p:cNvSpPr>
+          <p:nvPr>
+            <p:ph type="body" idx="1"/>
+          </p:nvPr>
+        </p:nvSpPr>
+        <p:spPr/>
+        <p:txBody>
+          <a:bodyPr/>
+          <a:lstStyle/>
+          <a:p>
+            <a:r>
+              <a:rPr kumimoji="1" lang="en-US" altLang="ko-KR" dirty="0"/>
+              <a:t>03/17 ~ 03/25</a:t>
+            </a:r>
+            <a:endParaRPr kumimoji="1" lang="ko-KR" altLang="en-US" dirty="0"/>
+          </a:p>
+        </p:txBody>
+      </p:sp>
+      <p:sp>
+        <p:nvSpPr>
+          <p:cNvPr id="4" name="슬라이드 번호 개체 틀 3"/>
+          <p:cNvSpPr>
+            <a:spLocks noGrp="1"/>
+          </p:cNvSpPr>
+          <p:nvPr>
+            <p:ph type="sldNum" sz="quarter" idx="5"/>
+          </p:nvPr>
+        </p:nvSpPr>
+        <p:spPr/>
+        <p:txBody>
+          <a:bodyPr/>
+          <a:lstStyle/>
+          <a:p>
+            <a:fld id="{06D6FB4C-B1D2-0943-9032-DC5CFB0CBEF3}" type="slidenum">
+              <a:rPr kumimoji="1" lang="ko-KR" altLang="en-US" smtClean="0"/>
+              <a:t>4</a:t>
+            </a:fld>
+            <a:endParaRPr kumimoji="1" lang="ko-KR" altLang="en-US"/>
+          </a:p>
+        </p:txBody>
+      </p:sp>
+    </p:spTree>
+    <p:extLst>
+      <p:ext uri="{BB962C8B-B14F-4D97-AF65-F5344CB8AC3E}">
+        <p14:creationId xmlns:p14="http://schemas.microsoft.com/office/powerpoint/2010/main" val="3146184078"/>
+      </p:ext>
+    </p:extLst>
+  </p:cSld>
+  <p:clrMapOvr>
+    <a:masterClrMapping/>
+  </p:clrMapOvr>
+</p:notes>
+</file>
+
 <file path=ppt/slideLayouts/slideLayout1.xml><?xml version="1.0" encoding="utf-8"?>
 <p:sldLayout xmlns:a="http://schemas.openxmlformats.org/drawingml/2006/main" xmlns:r="http://schemas.openxmlformats.org/officeDocument/2006/relationships" xmlns:p="http://schemas.openxmlformats.org/presentationml/2006/main" type="title" preserve="1">
   <p:cSld name="제목 슬라이드">
@@ -728,7 +817,7 @@
           <a:p>
             <a:fld id="{6C230EC4-A28F-0447-BB12-263E0B8A718F}" type="datetimeFigureOut">
               <a:rPr kumimoji="1" lang="ko-KR" altLang="en-US" smtClean="0"/>
-              <a:t>2021. 3. 20.</a:t>
+              <a:t>2021. 3. 26.</a:t>
             </a:fld>
             <a:endParaRPr kumimoji="1" lang="ko-KR" altLang="en-US"/>
           </a:p>
@@ -926,7 +1015,7 @@
           <a:p>
             <a:fld id="{6C230EC4-A28F-0447-BB12-263E0B8A718F}" type="datetimeFigureOut">
               <a:rPr kumimoji="1" lang="ko-KR" altLang="en-US" smtClean="0"/>
-              <a:t>2021. 3. 20.</a:t>
+              <a:t>2021. 3. 26.</a:t>
             </a:fld>
             <a:endParaRPr kumimoji="1" lang="ko-KR" altLang="en-US"/>
           </a:p>
@@ -1134,7 +1223,7 @@
           <a:p>
             <a:fld id="{6C230EC4-A28F-0447-BB12-263E0B8A718F}" type="datetimeFigureOut">
               <a:rPr kumimoji="1" lang="ko-KR" altLang="en-US" smtClean="0"/>
-              <a:t>2021. 3. 20.</a:t>
+              <a:t>2021. 3. 26.</a:t>
             </a:fld>
             <a:endParaRPr kumimoji="1" lang="ko-KR" altLang="en-US"/>
           </a:p>
@@ -1332,7 +1421,7 @@
           <a:p>
             <a:fld id="{6C230EC4-A28F-0447-BB12-263E0B8A718F}" type="datetimeFigureOut">
               <a:rPr kumimoji="1" lang="ko-KR" altLang="en-US" smtClean="0"/>
-              <a:t>2021. 3. 20.</a:t>
+              <a:t>2021. 3. 26.</a:t>
             </a:fld>
             <a:endParaRPr kumimoji="1" lang="ko-KR" altLang="en-US"/>
           </a:p>
@@ -1607,7 +1696,7 @@
           <a:p>
             <a:fld id="{6C230EC4-A28F-0447-BB12-263E0B8A718F}" type="datetimeFigureOut">
               <a:rPr kumimoji="1" lang="ko-KR" altLang="en-US" smtClean="0"/>
-              <a:t>2021. 3. 20.</a:t>
+              <a:t>2021. 3. 26.</a:t>
             </a:fld>
             <a:endParaRPr kumimoji="1" lang="ko-KR" altLang="en-US"/>
           </a:p>
@@ -1872,7 +1961,7 @@
           <a:p>
             <a:fld id="{6C230EC4-A28F-0447-BB12-263E0B8A718F}" type="datetimeFigureOut">
               <a:rPr kumimoji="1" lang="ko-KR" altLang="en-US" smtClean="0"/>
-              <a:t>2021. 3. 20.</a:t>
+              <a:t>2021. 3. 26.</a:t>
             </a:fld>
             <a:endParaRPr kumimoji="1" lang="ko-KR" altLang="en-US"/>
           </a:p>
@@ -2284,7 +2373,7 @@
           <a:p>
             <a:fld id="{6C230EC4-A28F-0447-BB12-263E0B8A718F}" type="datetimeFigureOut">
               <a:rPr kumimoji="1" lang="ko-KR" altLang="en-US" smtClean="0"/>
-              <a:t>2021. 3. 20.</a:t>
+              <a:t>2021. 3. 26.</a:t>
             </a:fld>
             <a:endParaRPr kumimoji="1" lang="ko-KR" altLang="en-US"/>
           </a:p>
@@ -2425,7 +2514,7 @@
           <a:p>
             <a:fld id="{6C230EC4-A28F-0447-BB12-263E0B8A718F}" type="datetimeFigureOut">
               <a:rPr kumimoji="1" lang="ko-KR" altLang="en-US" smtClean="0"/>
-              <a:t>2021. 3. 20.</a:t>
+              <a:t>2021. 3. 26.</a:t>
             </a:fld>
             <a:endParaRPr kumimoji="1" lang="ko-KR" altLang="en-US"/>
           </a:p>
@@ -2538,7 +2627,7 @@
           <a:p>
             <a:fld id="{6C230EC4-A28F-0447-BB12-263E0B8A718F}" type="datetimeFigureOut">
               <a:rPr kumimoji="1" lang="ko-KR" altLang="en-US" smtClean="0"/>
-              <a:t>2021. 3. 20.</a:t>
+              <a:t>2021. 3. 26.</a:t>
             </a:fld>
             <a:endParaRPr kumimoji="1" lang="ko-KR" altLang="en-US"/>
           </a:p>
@@ -2849,7 +2938,7 @@
           <a:p>
             <a:fld id="{6C230EC4-A28F-0447-BB12-263E0B8A718F}" type="datetimeFigureOut">
               <a:rPr kumimoji="1" lang="ko-KR" altLang="en-US" smtClean="0"/>
-              <a:t>2021. 3. 20.</a:t>
+              <a:t>2021. 3. 26.</a:t>
             </a:fld>
             <a:endParaRPr kumimoji="1" lang="ko-KR" altLang="en-US"/>
           </a:p>
@@ -3137,7 +3226,7 @@
           <a:p>
             <a:fld id="{6C230EC4-A28F-0447-BB12-263E0B8A718F}" type="datetimeFigureOut">
               <a:rPr kumimoji="1" lang="ko-KR" altLang="en-US" smtClean="0"/>
-              <a:t>2021. 3. 20.</a:t>
+              <a:t>2021. 3. 26.</a:t>
             </a:fld>
             <a:endParaRPr kumimoji="1" lang="ko-KR" altLang="en-US"/>
           </a:p>
@@ -3378,7 +3467,7 @@
           <a:p>
             <a:fld id="{6C230EC4-A28F-0447-BB12-263E0B8A718F}" type="datetimeFigureOut">
               <a:rPr kumimoji="1" lang="ko-KR" altLang="en-US" smtClean="0"/>
-              <a:t>2021. 3. 20.</a:t>
+              <a:t>2021. 3. 26.</a:t>
             </a:fld>
             <a:endParaRPr kumimoji="1" lang="ko-KR" altLang="en-US"/>
           </a:p>
@@ -4010,6 +4099,66 @@
     <p:extLst>
       <p:ext uri="{BB962C8B-B14F-4D97-AF65-F5344CB8AC3E}">
         <p14:creationId xmlns:p14="http://schemas.microsoft.com/office/powerpoint/2010/main" val="641385631"/>
+      </p:ext>
+    </p:extLst>
+  </p:cSld>
+  <p:clrMapOvr>
+    <a:masterClrMapping/>
+  </p:clrMapOvr>
+</p:sld>
+</file>
+
+<file path=ppt/slides/slide4.xml><?xml version="1.0" encoding="utf-8"?>
+<p:sld xmlns:a="http://schemas.openxmlformats.org/drawingml/2006/main" xmlns:r="http://schemas.openxmlformats.org/officeDocument/2006/relationships" xmlns:p="http://schemas.openxmlformats.org/presentationml/2006/main">
+  <p:cSld>
+    <p:spTree>
+      <p:nvGrpSpPr>
+        <p:cNvPr id="1" name=""/>
+        <p:cNvGrpSpPr/>
+        <p:nvPr/>
+      </p:nvGrpSpPr>
+      <p:grpSpPr>
+        <a:xfrm>
+          <a:off x="0" y="0"/>
+          <a:ext cx="0" cy="0"/>
+          <a:chOff x="0" y="0"/>
+          <a:chExt cx="0" cy="0"/>
+        </a:xfrm>
+      </p:grpSpPr>
+      <p:pic>
+        <p:nvPicPr>
+          <p:cNvPr id="8" name="그림 7">
+            <a:extLst>
+              <a:ext uri="{FF2B5EF4-FFF2-40B4-BE49-F238E27FC236}">
+                <a16:creationId xmlns:a16="http://schemas.microsoft.com/office/drawing/2014/main" id="{37DF79DA-530C-0A43-A07F-077372BB961D}"/>
+              </a:ext>
+            </a:extLst>
+          </p:cNvPr>
+          <p:cNvPicPr>
+            <a:picLocks noChangeAspect="1"/>
+          </p:cNvPicPr>
+          <p:nvPr/>
+        </p:nvPicPr>
+        <p:blipFill>
+          <a:blip r:embed="rId3"/>
+          <a:stretch>
+            <a:fillRect/>
+          </a:stretch>
+        </p:blipFill>
+        <p:spPr>
+          <a:xfrm>
+            <a:off x="2536207" y="1695450"/>
+            <a:ext cx="7594600" cy="3467100"/>
+          </a:xfrm>
+          <a:prstGeom prst="rect">
+            <a:avLst/>
+          </a:prstGeom>
+        </p:spPr>
+      </p:pic>
+    </p:spTree>
+    <p:extLst>
+      <p:ext uri="{BB962C8B-B14F-4D97-AF65-F5344CB8AC3E}">
+        <p14:creationId xmlns:p14="http://schemas.microsoft.com/office/powerpoint/2010/main" val="3349622157"/>
       </p:ext>
     </p:extLst>
   </p:cSld>

</xml_diff>